<commit_message>
FINAL FINAL commit for Raphael
</commit_message>
<xml_diff>
--- a/results/York Vectors presentation.pptx
+++ b/results/York Vectors presentation.pptx
@@ -273,7 +273,7 @@
       </p15:sldGuideLst>
     </p:ext>
     <p:ext uri="GoogleSlidesCustomDataVersion2">
-      <go:slidesCustomData xmlns:go="http://customooxmlschemas.google.com/" xmlns:ahyp="http://schemas.microsoft.com/office/drawing/2018/hyperlinkcolor" xmlns:p15="http://schemas.microsoft.com/office/powerpoint/2012/main" xmlns:p14="http://schemas.microsoft.com/office/powerpoint/2010/main" xmlns:com="http://schemas.openxmlformats.org/drawingml/2006/compatibility" xmlns:pvml="urn:schemas-microsoft-com:office:powerpoint" xmlns:v="urn:schemas-microsoft-com:vml" xmlns:o="urn:schemas-microsoft-com:office:office" xmlns:dgm="http://schemas.openxmlformats.org/drawingml/2006/diagram" xmlns:c="http://schemas.openxmlformats.org/drawingml/2006/chart" xmlns:mv="urn:schemas-microsoft-com:mac:vml" xmlns:mc="http://schemas.openxmlformats.org/markup-compatibility/2006" xmlns="" r:id="rId23" roundtripDataSignature="AMtx7mh2ISq/uFISOsjGh26iAtwL8xWg0A=="/>
+      <go:slidesCustomData xmlns="" xmlns:mc="http://schemas.openxmlformats.org/markup-compatibility/2006" xmlns:mv="urn:schemas-microsoft-com:mac:vml" xmlns:c="http://schemas.openxmlformats.org/drawingml/2006/chart" xmlns:dgm="http://schemas.openxmlformats.org/drawingml/2006/diagram" xmlns:o="urn:schemas-microsoft-com:office:office" xmlns:v="urn:schemas-microsoft-com:vml" xmlns:pvml="urn:schemas-microsoft-com:office:powerpoint" xmlns:com="http://schemas.openxmlformats.org/drawingml/2006/compatibility" xmlns:p14="http://schemas.microsoft.com/office/powerpoint/2010/main" xmlns:p15="http://schemas.microsoft.com/office/powerpoint/2012/main" xmlns:ahyp="http://schemas.microsoft.com/office/drawing/2018/hyperlinkcolor" xmlns:go="http://customooxmlschemas.google.com/" r:id="rId23" roundtripDataSignature="AMtx7mh2ISq/uFISOsjGh26iAtwL8xWg0A=="/>
     </p:ext>
   </p:extLst>
 </p:presentation>
@@ -1234,7 +1234,7 @@
         </p:nvSpPr>
         <p:spPr>
           <a:xfrm>
-            <a:off x="381300" y="685800"/>
+            <a:off x="381000" y="685800"/>
             <a:ext cx="6096000" cy="3429000"/>
           </a:xfrm>
           <a:custGeom>
@@ -1356,7 +1356,7 @@
         </p:nvSpPr>
         <p:spPr>
           <a:xfrm>
-            <a:off x="381300" y="685800"/>
+            <a:off x="381000" y="685800"/>
             <a:ext cx="6096000" cy="3429000"/>
           </a:xfrm>
           <a:custGeom>
@@ -1600,7 +1600,7 @@
         </p:nvSpPr>
         <p:spPr>
           <a:xfrm>
-            <a:off x="381300" y="685800"/>
+            <a:off x="381000" y="685800"/>
             <a:ext cx="6096000" cy="3429000"/>
           </a:xfrm>
           <a:custGeom>
@@ -11681,17 +11681,14 @@
           <p:nvPr/>
         </p:nvPicPr>
         <p:blipFill>
-          <a:blip r:embed="rId3">
-            <a:alphaModFix/>
-          </a:blip>
-          <a:stretch>
-            <a:fillRect/>
-          </a:stretch>
+          <a:blip r:embed="rId3"/>
+          <a:srcRect/>
+          <a:stretch/>
         </p:blipFill>
         <p:spPr>
           <a:xfrm>
-            <a:off x="4537950" y="1106272"/>
-            <a:ext cx="4319999" cy="3084480"/>
+            <a:off x="4538813" y="1106272"/>
+            <a:ext cx="4318272" cy="3084480"/>
           </a:xfrm>
           <a:prstGeom prst="rect">
             <a:avLst/>
@@ -11709,17 +11706,14 @@
           <p:nvPr/>
         </p:nvPicPr>
         <p:blipFill>
-          <a:blip r:embed="rId4">
-            <a:alphaModFix/>
-          </a:blip>
-          <a:stretch>
-            <a:fillRect/>
-          </a:stretch>
+          <a:blip r:embed="rId4"/>
+          <a:srcRect/>
+          <a:stretch/>
         </p:blipFill>
         <p:spPr>
           <a:xfrm>
-            <a:off x="217950" y="1105934"/>
-            <a:ext cx="4319999" cy="3085181"/>
+            <a:off x="218323" y="1105934"/>
+            <a:ext cx="4319253" cy="3085181"/>
           </a:xfrm>
           <a:prstGeom prst="rect">
             <a:avLst/>
@@ -12334,10 +12328,10 @@
         </p:nvGrpSpPr>
         <p:grpSpPr>
           <a:xfrm>
-            <a:off x="252000" y="1183060"/>
-            <a:ext cx="8639999" cy="3084480"/>
-            <a:chOff x="252000" y="1029510"/>
-            <a:chExt cx="8639999" cy="3084480"/>
+            <a:off x="252871" y="1183060"/>
+            <a:ext cx="8639128" cy="3084480"/>
+            <a:chOff x="252871" y="1029510"/>
+            <a:chExt cx="8639128" cy="3084480"/>
           </a:xfrm>
         </p:grpSpPr>
         <p:grpSp>
@@ -12348,10 +12342,10 @@
           </p:nvGrpSpPr>
           <p:grpSpPr>
             <a:xfrm>
-              <a:off x="252000" y="1029510"/>
-              <a:ext cx="8639999" cy="3084480"/>
-              <a:chOff x="152400" y="1029513"/>
-              <a:chExt cx="8639999" cy="3084480"/>
+              <a:off x="252871" y="1029510"/>
+              <a:ext cx="8639128" cy="3084480"/>
+              <a:chOff x="153271" y="1029513"/>
+              <a:chExt cx="8639128" cy="3084480"/>
             </a:xfrm>
           </p:grpSpPr>
           <p:pic>
@@ -12361,17 +12355,14 @@
               <p:nvPr/>
             </p:nvPicPr>
             <p:blipFill>
-              <a:blip r:embed="rId3">
-                <a:alphaModFix/>
-              </a:blip>
-              <a:stretch>
-                <a:fillRect/>
-              </a:stretch>
+              <a:blip r:embed="rId3"/>
+              <a:srcRect/>
+              <a:stretch/>
             </p:blipFill>
             <p:spPr>
               <a:xfrm>
-                <a:off x="152400" y="1029513"/>
-                <a:ext cx="4319999" cy="3084469"/>
+                <a:off x="153271" y="1029513"/>
+                <a:ext cx="4318256" cy="3084469"/>
               </a:xfrm>
               <a:prstGeom prst="rect">
                 <a:avLst/>
@@ -13278,7 +13269,7 @@
         </p:spPr>
         <p:txBody>
           <a:bodyPr spcFirstLastPara="1" wrap="square" lIns="91425" tIns="91425" rIns="91425" bIns="91425" anchor="t" anchorCtr="0">
-            <a:normAutofit fontScale="92500" lnSpcReduction="20000"/>
+            <a:normAutofit fontScale="85000" lnSpcReduction="10000"/>
           </a:bodyPr>
           <a:lstStyle/>
           <a:p>

</xml_diff>